<commit_message>
Add github repo link
</commit_message>
<xml_diff>
--- a/docs/elaborato.pptx
+++ b/docs/elaborato.pptx
@@ -19287,6 +19287,79 @@
           </p:txBody>
         </p:sp>
       </p:grpSp>
+      <p:sp>
+        <p:nvSpPr>
+          <p:cNvPr id="2" name="Google Shape;1074;p38">
+            <a:extLst>
+              <a:ext uri="{FF2B5EF4-FFF2-40B4-BE49-F238E27FC236}">
+                <a16:creationId xmlns:a16="http://schemas.microsoft.com/office/drawing/2014/main" id="{2253E070-5728-71A6-F35A-DBA4B6A6DA0A}"/>
+              </a:ext>
+            </a:extLst>
+          </p:cNvPr>
+          <p:cNvSpPr txBox="1"/>
+          <p:nvPr/>
+        </p:nvSpPr>
+        <p:spPr>
+          <a:xfrm>
+            <a:off x="3674154" y="817458"/>
+            <a:ext cx="1795491" cy="252900"/>
+          </a:xfrm>
+          <a:prstGeom prst="rect">
+            <a:avLst/>
+          </a:prstGeom>
+          <a:noFill/>
+          <a:ln>
+            <a:noFill/>
+          </a:ln>
+        </p:spPr>
+        <p:txBody>
+          <a:bodyPr spcFirstLastPara="1" wrap="square" lIns="91425" tIns="91425" rIns="91425" bIns="91425" anchor="ctr" anchorCtr="0">
+            <a:noAutofit/>
+          </a:bodyPr>
+          <a:lstStyle/>
+          <a:p>
+            <a:pPr marL="0" lvl="0" indent="0" algn="ctr" rtl="0">
+              <a:spcBef>
+                <a:spcPts val="0"/>
+              </a:spcBef>
+              <a:spcAft>
+                <a:spcPts val="0"/>
+              </a:spcAft>
+              <a:buNone/>
+            </a:pPr>
+            <a:r>
+              <a:rPr lang="en-US" sz="800" b="1" u="sng" noProof="0" dirty="0">
+                <a:solidFill>
+                  <a:srgbClr val="869FB2"/>
+                </a:solidFill>
+                <a:latin typeface="Roboto" panose="02000000000000000000" pitchFamily="2" charset="0"/>
+                <a:ea typeface="Roboto" panose="02000000000000000000" pitchFamily="2" charset="0"/>
+                <a:cs typeface="Roboto" panose="02000000000000000000" pitchFamily="2" charset="0"/>
+                <a:hlinkClick r:id="rId9">
+                  <a:extLst>
+                    <a:ext uri="{A12FA001-AC4F-418D-AE19-62706E023703}">
+                      <ahyp:hlinkClr xmlns:ahyp="http://schemas.microsoft.com/office/drawing/2018/hyperlinkcolor" val="tx"/>
+                    </a:ext>
+                  </a:extLst>
+                </a:hlinkClick>
+              </a:rPr>
+              <a:t>GitHub Repo</a:t>
+            </a:r>
+            <a:r>
+              <a:rPr lang="en-US" sz="800" noProof="0" dirty="0">
+                <a:solidFill>
+                  <a:schemeClr val="dk1"/>
+                </a:solidFill>
+                <a:latin typeface="Roboto" panose="02000000000000000000" pitchFamily="2" charset="0"/>
+                <a:ea typeface="Roboto" panose="02000000000000000000" pitchFamily="2" charset="0"/>
+                <a:cs typeface="Roboto" panose="02000000000000000000" pitchFamily="2" charset="0"/>
+                <a:sym typeface="Roboto"/>
+              </a:rPr>
+              <a:t> </a:t>
+            </a:r>
+          </a:p>
+        </p:txBody>
+      </p:sp>
     </p:spTree>
     <p:extLst>
       <p:ext uri="{BB962C8B-B14F-4D97-AF65-F5344CB8AC3E}">

</xml_diff>